<commit_message>
revise solution after paper review
</commit_message>
<xml_diff>
--- a/reports/images.pptx
+++ b/reports/images.pptx
@@ -18586,7 +18586,7 @@
                     </m:oMath>
                   </m:oMathPara>
                 </a14:m>
-                <a:endParaRPr lang="en-US" sz="2000">
+                <a:endParaRPr lang="en-US" sz="2000" dirty="0">
                   <a:latin typeface="Times New Roman" panose="02020603050405020304" pitchFamily="18" charset="0"/>
                   <a:cs typeface="Times New Roman" panose="02020603050405020304" pitchFamily="18" charset="0"/>
                 </a:endParaRPr>
@@ -19241,21 +19241,10 @@
               </a:bodyPr>
               <a:lstStyle/>
               <a:p>
-                <a:pPr marL="0" marR="0" lvl="0" indent="0" algn="l" defTabSz="821531" rtl="0" eaLnBrk="1" fontAlgn="auto" latinLnBrk="0" hangingPunct="0">
+                <a:pPr lvl="0" defTabSz="821531" hangingPunct="0">
                   <a:lnSpc>
                     <a:spcPct val="150000"/>
                   </a:lnSpc>
-                  <a:spcBef>
-                    <a:spcPts val="0"/>
-                  </a:spcBef>
-                  <a:spcAft>
-                    <a:spcPts val="0"/>
-                  </a:spcAft>
-                  <a:buClrTx/>
-                  <a:buSzTx/>
-                  <a:buFontTx/>
-                  <a:buNone/>
-                  <a:tabLst/>
                   <a:defRPr/>
                 </a:pPr>
                 <a:r>
@@ -19374,7 +19363,74 @@
                     <a:cs typeface="Helvetica Neue"/>
                     <a:sym typeface="Helvetica Neue"/>
                   </a:rPr>
-                  <a:t>of input variable at a time:</a:t>
+                  <a:t>of </a:t>
+                </a:r>
+                <a:r>
+                  <a:rPr kumimoji="0" lang="en-US" sz="2000" b="0" i="0" u="none" strike="noStrike" kern="1200" cap="none" spc="0" normalizeH="0" baseline="0" noProof="0" dirty="0">
+                    <a:ln>
+                      <a:noFill/>
+                    </a:ln>
+                    <a:solidFill>
+                      <a:schemeClr val="accent6"/>
+                    </a:solidFill>
+                    <a:effectLst/>
+                    <a:uLnTx/>
+                    <a:uFillTx/>
+                    <a:latin typeface="Calibri" panose="020F0502020204030204"/>
+                    <a:ea typeface="Helvetica Neue"/>
+                    <a:cs typeface="Helvetica Neue"/>
+                    <a:sym typeface="Helvetica Neue"/>
+                  </a:rPr>
+                  <a:t>input variable </a:t>
+                </a:r>
+                <a:r>
+                  <a:rPr kumimoji="0" lang="en-US" sz="2000" b="0" i="0" u="none" strike="noStrike" kern="1200" cap="none" spc="0" normalizeH="0" baseline="0" noProof="0" dirty="0">
+                    <a:ln>
+                      <a:noFill/>
+                    </a:ln>
+                    <a:solidFill>
+                      <a:srgbClr val="000000"/>
+                    </a:solidFill>
+                    <a:effectLst/>
+                    <a:uLnTx/>
+                    <a:uFillTx/>
+                    <a:latin typeface="Calibri" panose="020F0502020204030204"/>
+                    <a:ea typeface="Helvetica Neue"/>
+                    <a:cs typeface="Helvetica Neue"/>
+                    <a:sym typeface="Helvetica Neue"/>
+                  </a:rPr>
+                  <a:t>(</a:t>
+                </a:r>
+                <a14:m>
+                  <m:oMath xmlns:m="http://schemas.openxmlformats.org/officeDocument/2006/math">
+                    <m:r>
+                      <a:rPr lang="en-US" sz="2000" b="1" i="1" smtClean="0">
+                        <a:solidFill>
+                          <a:schemeClr val="accent6"/>
+                        </a:solidFill>
+                        <a:latin typeface="Cambria Math" panose="02040503050406030204" pitchFamily="18" charset="0"/>
+                      </a:rPr>
+                      <m:t>𝒙</m:t>
+                    </m:r>
+                  </m:oMath>
+                </a14:m>
+                <a:r>
+                  <a:rPr kumimoji="0" lang="en-US" sz="2000" b="0" i="0" u="none" strike="noStrike" kern="1200" cap="none" spc="0" normalizeH="0" baseline="0" noProof="0" dirty="0">
+                    <a:ln>
+                      <a:noFill/>
+                    </a:ln>
+                    <a:solidFill>
+                      <a:srgbClr val="000000"/>
+                    </a:solidFill>
+                    <a:effectLst/>
+                    <a:uLnTx/>
+                    <a:uFillTx/>
+                    <a:latin typeface="Calibri" panose="020F0502020204030204"/>
+                    <a:ea typeface="Helvetica Neue"/>
+                    <a:cs typeface="Helvetica Neue"/>
+                    <a:sym typeface="Helvetica Neue"/>
+                  </a:rPr>
+                  <a:t>) at a time:</a:t>
                 </a:r>
               </a:p>
             </p:txBody>

</xml_diff>